<commit_message>
improve placing of dots in network digrams
</commit_message>
<xml_diff>
--- a/figures/main/conceptual_model/conceptual_model.pptx
+++ b/figures/main/conceptual_model/conceptual_model.pptx
@@ -104,6 +104,11 @@
       </a:defRPr>
     </a:lvl9pPr>
   </p:defaultTextStyle>
+  <p:extLst>
+    <p:ext uri="{EFAFB233-063F-42B5-8137-9DF3F51BA10A}">
+      <p15:sldGuideLst xmlns:p15="http://schemas.microsoft.com/office/powerpoint/2012/main"/>
+    </p:ext>
+  </p:extLst>
 </p:presentation>
 </file>
 
@@ -238,7 +243,7 @@
           <a:p>
             <a:fld id="{0C04CBE9-D9B1-4A49-9D6E-53882BEFF763}" type="datetimeFigureOut">
               <a:rPr lang="en-US" smtClean="0"/>
-              <a:t>9/27/2025</a:t>
+              <a:t>9/30/2025</a:t>
             </a:fld>
             <a:endParaRPr lang="en-US"/>
           </a:p>
@@ -408,7 +413,7 @@
           <a:p>
             <a:fld id="{0C04CBE9-D9B1-4A49-9D6E-53882BEFF763}" type="datetimeFigureOut">
               <a:rPr lang="en-US" smtClean="0"/>
-              <a:t>9/27/2025</a:t>
+              <a:t>9/30/2025</a:t>
             </a:fld>
             <a:endParaRPr lang="en-US"/>
           </a:p>
@@ -588,7 +593,7 @@
           <a:p>
             <a:fld id="{0C04CBE9-D9B1-4A49-9D6E-53882BEFF763}" type="datetimeFigureOut">
               <a:rPr lang="en-US" smtClean="0"/>
-              <a:t>9/27/2025</a:t>
+              <a:t>9/30/2025</a:t>
             </a:fld>
             <a:endParaRPr lang="en-US"/>
           </a:p>
@@ -758,7 +763,7 @@
           <a:p>
             <a:fld id="{0C04CBE9-D9B1-4A49-9D6E-53882BEFF763}" type="datetimeFigureOut">
               <a:rPr lang="en-US" smtClean="0"/>
-              <a:t>9/27/2025</a:t>
+              <a:t>9/30/2025</a:t>
             </a:fld>
             <a:endParaRPr lang="en-US"/>
           </a:p>
@@ -1004,7 +1009,7 @@
           <a:p>
             <a:fld id="{0C04CBE9-D9B1-4A49-9D6E-53882BEFF763}" type="datetimeFigureOut">
               <a:rPr lang="en-US" smtClean="0"/>
-              <a:t>9/27/2025</a:t>
+              <a:t>9/30/2025</a:t>
             </a:fld>
             <a:endParaRPr lang="en-US"/>
           </a:p>
@@ -1236,7 +1241,7 @@
           <a:p>
             <a:fld id="{0C04CBE9-D9B1-4A49-9D6E-53882BEFF763}" type="datetimeFigureOut">
               <a:rPr lang="en-US" smtClean="0"/>
-              <a:t>9/27/2025</a:t>
+              <a:t>9/30/2025</a:t>
             </a:fld>
             <a:endParaRPr lang="en-US"/>
           </a:p>
@@ -1603,7 +1608,7 @@
           <a:p>
             <a:fld id="{0C04CBE9-D9B1-4A49-9D6E-53882BEFF763}" type="datetimeFigureOut">
               <a:rPr lang="en-US" smtClean="0"/>
-              <a:t>9/27/2025</a:t>
+              <a:t>9/30/2025</a:t>
             </a:fld>
             <a:endParaRPr lang="en-US"/>
           </a:p>
@@ -1721,7 +1726,7 @@
           <a:p>
             <a:fld id="{0C04CBE9-D9B1-4A49-9D6E-53882BEFF763}" type="datetimeFigureOut">
               <a:rPr lang="en-US" smtClean="0"/>
-              <a:t>9/27/2025</a:t>
+              <a:t>9/30/2025</a:t>
             </a:fld>
             <a:endParaRPr lang="en-US"/>
           </a:p>
@@ -1816,7 +1821,7 @@
           <a:p>
             <a:fld id="{0C04CBE9-D9B1-4A49-9D6E-53882BEFF763}" type="datetimeFigureOut">
               <a:rPr lang="en-US" smtClean="0"/>
-              <a:t>9/27/2025</a:t>
+              <a:t>9/30/2025</a:t>
             </a:fld>
             <a:endParaRPr lang="en-US"/>
           </a:p>
@@ -2093,7 +2098,7 @@
           <a:p>
             <a:fld id="{0C04CBE9-D9B1-4A49-9D6E-53882BEFF763}" type="datetimeFigureOut">
               <a:rPr lang="en-US" smtClean="0"/>
-              <a:t>9/27/2025</a:t>
+              <a:t>9/30/2025</a:t>
             </a:fld>
             <a:endParaRPr lang="en-US"/>
           </a:p>
@@ -2350,7 +2355,7 @@
           <a:p>
             <a:fld id="{0C04CBE9-D9B1-4A49-9D6E-53882BEFF763}" type="datetimeFigureOut">
               <a:rPr lang="en-US" smtClean="0"/>
-              <a:t>9/27/2025</a:t>
+              <a:t>9/30/2025</a:t>
             </a:fld>
             <a:endParaRPr lang="en-US"/>
           </a:p>
@@ -2563,7 +2568,7 @@
           <a:p>
             <a:fld id="{0C04CBE9-D9B1-4A49-9D6E-53882BEFF763}" type="datetimeFigureOut">
               <a:rPr lang="en-US" smtClean="0"/>
-              <a:t>9/27/2025</a:t>
+              <a:t>9/30/2025</a:t>
             </a:fld>
             <a:endParaRPr lang="en-US"/>
           </a:p>
@@ -3619,7 +3624,7 @@
       </p:sp>
       <p:sp>
         <p:nvSpPr>
-          <p:cNvPr id="30" name="Ellipse 29"/>
+          <p:cNvPr id="30" name="Rectangle à coins arrondis 29"/>
           <p:cNvSpPr/>
           <p:nvPr/>
         </p:nvSpPr>
@@ -3628,7 +3633,7 @@
             <a:off x="6784946" y="2082509"/>
             <a:ext cx="401443" cy="401443"/>
           </a:xfrm>
-          <a:prstGeom prst="ellipse">
+          <a:prstGeom prst="roundRect">
             <a:avLst/>
           </a:prstGeom>
           <a:solidFill>
@@ -3684,7 +3689,7 @@
       </p:sp>
       <p:sp>
         <p:nvSpPr>
-          <p:cNvPr id="31" name="Ellipse 30"/>
+          <p:cNvPr id="31" name="Rectangle à coins arrondis 30"/>
           <p:cNvSpPr/>
           <p:nvPr/>
         </p:nvSpPr>
@@ -3693,7 +3698,7 @@
             <a:off x="8355277" y="3093113"/>
             <a:ext cx="401443" cy="401443"/>
           </a:xfrm>
-          <a:prstGeom prst="ellipse">
+          <a:prstGeom prst="roundRect">
             <a:avLst/>
           </a:prstGeom>
           <a:solidFill>
@@ -3749,7 +3754,7 @@
       </p:sp>
       <p:sp>
         <p:nvSpPr>
-          <p:cNvPr id="32" name="Ellipse 31"/>
+          <p:cNvPr id="32" name="Rectangle à coins arrondis 31"/>
           <p:cNvSpPr/>
           <p:nvPr/>
         </p:nvSpPr>
@@ -3758,7 +3763,7 @@
             <a:off x="7953834" y="4986202"/>
             <a:ext cx="401443" cy="401443"/>
           </a:xfrm>
-          <a:prstGeom prst="ellipse">
+          <a:prstGeom prst="roundRect">
             <a:avLst/>
           </a:prstGeom>
           <a:solidFill>
@@ -3814,7 +3819,7 @@
       </p:sp>
       <p:sp>
         <p:nvSpPr>
-          <p:cNvPr id="33" name="Ellipse 32"/>
+          <p:cNvPr id="33" name="Rectangle à coins arrondis 32"/>
           <p:cNvSpPr/>
           <p:nvPr/>
         </p:nvSpPr>
@@ -3823,7 +3828,7 @@
             <a:off x="6587084" y="5764344"/>
             <a:ext cx="401443" cy="401443"/>
           </a:xfrm>
-          <a:prstGeom prst="ellipse">
+          <a:prstGeom prst="roundRect">
             <a:avLst/>
           </a:prstGeom>
           <a:solidFill>
@@ -3879,7 +3884,7 @@
       </p:sp>
       <p:sp>
         <p:nvSpPr>
-          <p:cNvPr id="35" name="Ellipse 34"/>
+          <p:cNvPr id="35" name="Rectangle à coins arrondis 34"/>
           <p:cNvSpPr/>
           <p:nvPr/>
         </p:nvSpPr>
@@ -3888,7 +3893,7 @@
             <a:off x="5253592" y="2763575"/>
             <a:ext cx="401443" cy="401443"/>
           </a:xfrm>
-          <a:prstGeom prst="ellipse">
+          <a:prstGeom prst="roundRect">
             <a:avLst/>
           </a:prstGeom>
           <a:solidFill>
@@ -3975,7 +3980,7 @@
       </p:sp>
       <p:sp>
         <p:nvSpPr>
-          <p:cNvPr id="38" name="Ellipse 37"/>
+          <p:cNvPr id="38" name="Rectangle à coins arrondis 37"/>
           <p:cNvSpPr/>
           <p:nvPr/>
         </p:nvSpPr>
@@ -3984,7 +3989,7 @@
             <a:off x="827497" y="1057133"/>
             <a:ext cx="291095" cy="291095"/>
           </a:xfrm>
-          <a:prstGeom prst="ellipse">
+          <a:prstGeom prst="roundRect">
             <a:avLst/>
           </a:prstGeom>
           <a:solidFill>
@@ -4053,55 +4058,6 @@
       </p:sp>
       <p:sp>
         <p:nvSpPr>
-          <p:cNvPr id="42" name="Rectangle à coins arrondis 41"/>
-          <p:cNvSpPr/>
-          <p:nvPr/>
-        </p:nvSpPr>
-        <p:spPr>
-          <a:xfrm>
-            <a:off x="763667" y="1869851"/>
-            <a:ext cx="267239" cy="267239"/>
-          </a:xfrm>
-          <a:prstGeom prst="roundRect">
-            <a:avLst/>
-          </a:prstGeom>
-          <a:solidFill>
-            <a:schemeClr val="bg1"/>
-          </a:solidFill>
-          <a:ln w="19050">
-            <a:solidFill>
-              <a:schemeClr val="tx1"/>
-            </a:solidFill>
-            <a:prstDash val="solid"/>
-          </a:ln>
-        </p:spPr>
-        <p:style>
-          <a:lnRef idx="2">
-            <a:schemeClr val="accent1">
-              <a:shade val="50000"/>
-            </a:schemeClr>
-          </a:lnRef>
-          <a:fillRef idx="1">
-            <a:schemeClr val="accent1"/>
-          </a:fillRef>
-          <a:effectRef idx="0">
-            <a:schemeClr val="accent1"/>
-          </a:effectRef>
-          <a:fontRef idx="minor">
-            <a:schemeClr val="lt1"/>
-          </a:fontRef>
-        </p:style>
-        <p:txBody>
-          <a:bodyPr rtlCol="0" anchor="ctr"/>
-          <a:lstStyle/>
-          <a:p>
-            <a:pPr algn="ctr"/>
-            <a:endParaRPr lang="en-US"/>
-          </a:p>
-        </p:txBody>
-      </p:sp>
-      <p:sp>
-        <p:nvSpPr>
           <p:cNvPr id="43" name="ZoneTexte 42"/>
           <p:cNvSpPr txBox="1"/>
           <p:nvPr/>
@@ -4133,10 +4089,7 @@
       <p:cxnSp>
         <p:nvCxnSpPr>
           <p:cNvPr id="55" name="Connecteur droit avec flèche 54"/>
-          <p:cNvCxnSpPr>
-            <a:stCxn id="30" idx="5"/>
-            <a:endCxn id="31" idx="1"/>
-          </p:cNvCxnSpPr>
+          <p:cNvCxnSpPr/>
           <p:nvPr/>
         </p:nvCxnSpPr>
         <p:spPr>
@@ -4172,10 +4125,7 @@
       <p:cxnSp>
         <p:nvCxnSpPr>
           <p:cNvPr id="56" name="Connecteur droit avec flèche 55"/>
-          <p:cNvCxnSpPr>
-            <a:stCxn id="31" idx="4"/>
-            <a:endCxn id="32" idx="0"/>
-          </p:cNvCxnSpPr>
+          <p:cNvCxnSpPr/>
           <p:nvPr/>
         </p:nvCxnSpPr>
         <p:spPr>
@@ -4211,10 +4161,7 @@
       <p:cxnSp>
         <p:nvCxnSpPr>
           <p:cNvPr id="59" name="Connecteur droit avec flèche 58"/>
-          <p:cNvCxnSpPr>
-            <a:stCxn id="32" idx="3"/>
-            <a:endCxn id="33" idx="7"/>
-          </p:cNvCxnSpPr>
+          <p:cNvCxnSpPr/>
           <p:nvPr/>
         </p:nvCxnSpPr>
         <p:spPr>
@@ -4250,10 +4197,7 @@
       <p:cxnSp>
         <p:nvCxnSpPr>
           <p:cNvPr id="62" name="Connecteur droit avec flèche 61"/>
-          <p:cNvCxnSpPr>
-            <a:stCxn id="33" idx="1"/>
-            <a:endCxn id="35" idx="4"/>
-          </p:cNvCxnSpPr>
+          <p:cNvCxnSpPr/>
           <p:nvPr/>
         </p:nvCxnSpPr>
         <p:spPr>
@@ -4289,10 +4233,7 @@
       <p:cxnSp>
         <p:nvCxnSpPr>
           <p:cNvPr id="68" name="Connecteur droit avec flèche 67"/>
-          <p:cNvCxnSpPr>
-            <a:stCxn id="35" idx="7"/>
-            <a:endCxn id="30" idx="2"/>
-          </p:cNvCxnSpPr>
+          <p:cNvCxnSpPr/>
           <p:nvPr/>
         </p:nvCxnSpPr>
         <p:spPr>
@@ -4453,7 +4394,7 @@
       </p:sp>
       <p:sp>
         <p:nvSpPr>
-          <p:cNvPr id="78" name="Ellipse 77"/>
+          <p:cNvPr id="78" name="Rectangle à coins arrondis 77"/>
           <p:cNvSpPr/>
           <p:nvPr/>
         </p:nvSpPr>
@@ -4462,7 +4403,7 @@
             <a:off x="4516907" y="3670004"/>
             <a:ext cx="401443" cy="401443"/>
           </a:xfrm>
-          <a:prstGeom prst="ellipse">
+          <a:prstGeom prst="roundRect">
             <a:avLst/>
           </a:prstGeom>
           <a:solidFill>
@@ -4508,17 +4449,12 @@
               </a:rPr>
               <a:t>?</a:t>
             </a:r>
-            <a:endParaRPr lang="en-US" dirty="0">
-              <a:solidFill>
-                <a:schemeClr val="tx1"/>
-              </a:solidFill>
-            </a:endParaRPr>
-          </a:p>
-        </p:txBody>
-      </p:sp>
-      <p:sp>
-        <p:nvSpPr>
-          <p:cNvPr id="79" name="Ellipse 78"/>
+          </a:p>
+        </p:txBody>
+      </p:sp>
+      <p:sp>
+        <p:nvSpPr>
+          <p:cNvPr id="79" name="Rectangle à coins arrondis 78"/>
           <p:cNvSpPr/>
           <p:nvPr/>
         </p:nvSpPr>
@@ -4527,7 +4463,7 @@
             <a:off x="4693166" y="5094231"/>
             <a:ext cx="401443" cy="401443"/>
           </a:xfrm>
-          <a:prstGeom prst="ellipse">
+          <a:prstGeom prst="roundRect">
             <a:avLst/>
           </a:prstGeom>
           <a:solidFill>
@@ -4573,11 +4509,6 @@
               </a:rPr>
               <a:t>?</a:t>
             </a:r>
-            <a:endParaRPr lang="en-US" dirty="0">
-              <a:solidFill>
-                <a:schemeClr val="tx1"/>
-              </a:solidFill>
-            </a:endParaRPr>
           </a:p>
         </p:txBody>
       </p:sp>
@@ -4638,6 +4569,57 @@
               <a:t>Legend</a:t>
             </a:r>
             <a:endParaRPr lang="en-US" b="1" dirty="0"/>
+          </a:p>
+        </p:txBody>
+      </p:sp>
+      <p:sp>
+        <p:nvSpPr>
+          <p:cNvPr id="41" name="Rectangle à coins arrondis 40"/>
+          <p:cNvSpPr/>
+          <p:nvPr/>
+        </p:nvSpPr>
+        <p:spPr>
+          <a:xfrm>
+            <a:off x="821547" y="1857227"/>
+            <a:ext cx="291095" cy="291095"/>
+          </a:xfrm>
+          <a:prstGeom prst="roundRect">
+            <a:avLst/>
+          </a:prstGeom>
+          <a:solidFill>
+            <a:schemeClr val="accent3">
+              <a:lumMod val="20000"/>
+              <a:lumOff val="80000"/>
+            </a:schemeClr>
+          </a:solidFill>
+          <a:ln w="38100">
+            <a:solidFill>
+              <a:schemeClr val="tx1"/>
+            </a:solidFill>
+          </a:ln>
+        </p:spPr>
+        <p:style>
+          <a:lnRef idx="2">
+            <a:schemeClr val="accent1">
+              <a:shade val="50000"/>
+            </a:schemeClr>
+          </a:lnRef>
+          <a:fillRef idx="1">
+            <a:schemeClr val="accent1"/>
+          </a:fillRef>
+          <a:effectRef idx="0">
+            <a:schemeClr val="accent1"/>
+          </a:effectRef>
+          <a:fontRef idx="minor">
+            <a:schemeClr val="lt1"/>
+          </a:fontRef>
+        </p:style>
+        <p:txBody>
+          <a:bodyPr rtlCol="0" anchor="ctr"/>
+          <a:lstStyle/>
+          <a:p>
+            <a:pPr algn="ctr"/>
+            <a:endParaRPr lang="en-US"/>
           </a:p>
         </p:txBody>
       </p:sp>

</xml_diff>

<commit_message>
change colour of nodes to grey on networks and enlarge text of main figures -- still need to do for glm figure
</commit_message>
<xml_diff>
--- a/figures/main/conceptual_model/conceptual_model.pptx
+++ b/figures/main/conceptual_model/conceptual_model.pptx
@@ -6,6 +6,7 @@
   </p:sldMasterIdLst>
   <p:sldIdLst>
     <p:sldId id="256" r:id="rId2"/>
+    <p:sldId id="257" r:id="rId3"/>
   </p:sldIdLst>
   <p:sldSz cx="14020800" cy="8229600"/>
   <p:notesSz cx="6858000" cy="9144000"/>
@@ -243,7 +244,7 @@
           <a:p>
             <a:fld id="{0C04CBE9-D9B1-4A49-9D6E-53882BEFF763}" type="datetimeFigureOut">
               <a:rPr lang="en-US" smtClean="0"/>
-              <a:t>9/30/2025</a:t>
+              <a:t>11/10/2025</a:t>
             </a:fld>
             <a:endParaRPr lang="en-US"/>
           </a:p>
@@ -413,7 +414,7 @@
           <a:p>
             <a:fld id="{0C04CBE9-D9B1-4A49-9D6E-53882BEFF763}" type="datetimeFigureOut">
               <a:rPr lang="en-US" smtClean="0"/>
-              <a:t>9/30/2025</a:t>
+              <a:t>11/10/2025</a:t>
             </a:fld>
             <a:endParaRPr lang="en-US"/>
           </a:p>
@@ -593,7 +594,7 @@
           <a:p>
             <a:fld id="{0C04CBE9-D9B1-4A49-9D6E-53882BEFF763}" type="datetimeFigureOut">
               <a:rPr lang="en-US" smtClean="0"/>
-              <a:t>9/30/2025</a:t>
+              <a:t>11/10/2025</a:t>
             </a:fld>
             <a:endParaRPr lang="en-US"/>
           </a:p>
@@ -763,7 +764,7 @@
           <a:p>
             <a:fld id="{0C04CBE9-D9B1-4A49-9D6E-53882BEFF763}" type="datetimeFigureOut">
               <a:rPr lang="en-US" smtClean="0"/>
-              <a:t>9/30/2025</a:t>
+              <a:t>11/10/2025</a:t>
             </a:fld>
             <a:endParaRPr lang="en-US"/>
           </a:p>
@@ -1009,7 +1010,7 @@
           <a:p>
             <a:fld id="{0C04CBE9-D9B1-4A49-9D6E-53882BEFF763}" type="datetimeFigureOut">
               <a:rPr lang="en-US" smtClean="0"/>
-              <a:t>9/30/2025</a:t>
+              <a:t>11/10/2025</a:t>
             </a:fld>
             <a:endParaRPr lang="en-US"/>
           </a:p>
@@ -1241,7 +1242,7 @@
           <a:p>
             <a:fld id="{0C04CBE9-D9B1-4A49-9D6E-53882BEFF763}" type="datetimeFigureOut">
               <a:rPr lang="en-US" smtClean="0"/>
-              <a:t>9/30/2025</a:t>
+              <a:t>11/10/2025</a:t>
             </a:fld>
             <a:endParaRPr lang="en-US"/>
           </a:p>
@@ -1608,7 +1609,7 @@
           <a:p>
             <a:fld id="{0C04CBE9-D9B1-4A49-9D6E-53882BEFF763}" type="datetimeFigureOut">
               <a:rPr lang="en-US" smtClean="0"/>
-              <a:t>9/30/2025</a:t>
+              <a:t>11/10/2025</a:t>
             </a:fld>
             <a:endParaRPr lang="en-US"/>
           </a:p>
@@ -1726,7 +1727,7 @@
           <a:p>
             <a:fld id="{0C04CBE9-D9B1-4A49-9D6E-53882BEFF763}" type="datetimeFigureOut">
               <a:rPr lang="en-US" smtClean="0"/>
-              <a:t>9/30/2025</a:t>
+              <a:t>11/10/2025</a:t>
             </a:fld>
             <a:endParaRPr lang="en-US"/>
           </a:p>
@@ -1821,7 +1822,7 @@
           <a:p>
             <a:fld id="{0C04CBE9-D9B1-4A49-9D6E-53882BEFF763}" type="datetimeFigureOut">
               <a:rPr lang="en-US" smtClean="0"/>
-              <a:t>9/30/2025</a:t>
+              <a:t>11/10/2025</a:t>
             </a:fld>
             <a:endParaRPr lang="en-US"/>
           </a:p>
@@ -2098,7 +2099,7 @@
           <a:p>
             <a:fld id="{0C04CBE9-D9B1-4A49-9D6E-53882BEFF763}" type="datetimeFigureOut">
               <a:rPr lang="en-US" smtClean="0"/>
-              <a:t>9/30/2025</a:t>
+              <a:t>11/10/2025</a:t>
             </a:fld>
             <a:endParaRPr lang="en-US"/>
           </a:p>
@@ -2355,7 +2356,7 @@
           <a:p>
             <a:fld id="{0C04CBE9-D9B1-4A49-9D6E-53882BEFF763}" type="datetimeFigureOut">
               <a:rPr lang="en-US" smtClean="0"/>
-              <a:t>9/30/2025</a:t>
+              <a:t>11/10/2025</a:t>
             </a:fld>
             <a:endParaRPr lang="en-US"/>
           </a:p>
@@ -2568,7 +2569,7 @@
           <a:p>
             <a:fld id="{0C04CBE9-D9B1-4A49-9D6E-53882BEFF763}" type="datetimeFigureOut">
               <a:rPr lang="en-US" smtClean="0"/>
-              <a:t>9/30/2025</a:t>
+              <a:t>11/10/2025</a:t>
             </a:fld>
             <a:endParaRPr lang="en-US"/>
           </a:p>
@@ -2988,6 +2989,1697 @@
             <a:avLst/>
           </a:prstGeom>
           <a:solidFill>
+            <a:schemeClr val="bg2">
+              <a:lumMod val="50000"/>
+            </a:schemeClr>
+          </a:solidFill>
+          <a:ln>
+            <a:solidFill>
+              <a:schemeClr val="tx1"/>
+            </a:solidFill>
+          </a:ln>
+        </p:spPr>
+        <p:style>
+          <a:lnRef idx="2">
+            <a:schemeClr val="accent1">
+              <a:shade val="50000"/>
+            </a:schemeClr>
+          </a:lnRef>
+          <a:fillRef idx="1">
+            <a:schemeClr val="accent1"/>
+          </a:fillRef>
+          <a:effectRef idx="0">
+            <a:schemeClr val="accent1"/>
+          </a:effectRef>
+          <a:fontRef idx="minor">
+            <a:schemeClr val="lt1"/>
+          </a:fontRef>
+        </p:style>
+        <p:txBody>
+          <a:bodyPr rot="0" spcFirstLastPara="0" vertOverflow="overflow" horzOverflow="overflow" vert="horz" wrap="square" lIns="91440" tIns="45720" rIns="91440" bIns="45720" numCol="1" spcCol="0" rtlCol="0" fromWordArt="0" anchor="ctr" anchorCtr="0" forceAA="0" compatLnSpc="1">
+            <a:prstTxWarp prst="textNoShape">
+              <a:avLst/>
+            </a:prstTxWarp>
+            <a:noAutofit/>
+          </a:bodyPr>
+          <a:lstStyle/>
+          <a:p>
+            <a:pPr algn="ctr"/>
+            <a:r>
+              <a:rPr lang="en-US" dirty="0">
+                <a:solidFill>
+                  <a:schemeClr val="bg1"/>
+                </a:solidFill>
+              </a:rPr>
+              <a:t>Publications</a:t>
+            </a:r>
+          </a:p>
+        </p:txBody>
+      </p:sp>
+      <p:sp>
+        <p:nvSpPr>
+          <p:cNvPr id="10" name="Rectangle à coins arrondis 9"/>
+          <p:cNvSpPr/>
+          <p:nvPr/>
+        </p:nvSpPr>
+        <p:spPr>
+          <a:xfrm>
+            <a:off x="8561974" y="4921387"/>
+            <a:ext cx="1639229" cy="345688"/>
+          </a:xfrm>
+          <a:prstGeom prst="roundRect">
+            <a:avLst/>
+          </a:prstGeom>
+          <a:solidFill>
+            <a:schemeClr val="bg2">
+              <a:lumMod val="50000"/>
+            </a:schemeClr>
+          </a:solidFill>
+          <a:ln>
+            <a:solidFill>
+              <a:schemeClr val="tx1"/>
+            </a:solidFill>
+          </a:ln>
+        </p:spPr>
+        <p:style>
+          <a:lnRef idx="2">
+            <a:schemeClr val="accent1">
+              <a:shade val="50000"/>
+            </a:schemeClr>
+          </a:lnRef>
+          <a:fillRef idx="1">
+            <a:schemeClr val="accent1"/>
+          </a:fillRef>
+          <a:effectRef idx="0">
+            <a:schemeClr val="accent1"/>
+          </a:effectRef>
+          <a:fontRef idx="minor">
+            <a:schemeClr val="lt1"/>
+          </a:fontRef>
+        </p:style>
+        <p:txBody>
+          <a:bodyPr rot="0" spcFirstLastPara="0" vertOverflow="overflow" horzOverflow="overflow" vert="horz" wrap="square" lIns="91440" tIns="45720" rIns="91440" bIns="45720" numCol="1" spcCol="0" rtlCol="0" fromWordArt="0" anchor="ctr" anchorCtr="0" forceAA="0" compatLnSpc="1">
+            <a:prstTxWarp prst="textNoShape">
+              <a:avLst/>
+            </a:prstTxWarp>
+            <a:noAutofit/>
+          </a:bodyPr>
+          <a:lstStyle/>
+          <a:p>
+            <a:pPr algn="ctr"/>
+            <a:r>
+              <a:rPr lang="en-US" dirty="0">
+                <a:solidFill>
+                  <a:schemeClr val="bg1"/>
+                </a:solidFill>
+              </a:rPr>
+              <a:t>Legislation</a:t>
+            </a:r>
+          </a:p>
+        </p:txBody>
+      </p:sp>
+      <p:sp>
+        <p:nvSpPr>
+          <p:cNvPr id="11" name="Rectangle à coins arrondis 10"/>
+          <p:cNvSpPr/>
+          <p:nvPr/>
+        </p:nvSpPr>
+        <p:spPr>
+          <a:xfrm>
+            <a:off x="2533876" y="3667600"/>
+            <a:ext cx="1639229" cy="345688"/>
+          </a:xfrm>
+          <a:prstGeom prst="roundRect">
+            <a:avLst/>
+          </a:prstGeom>
+          <a:solidFill>
+            <a:schemeClr val="bg2">
+              <a:lumMod val="50000"/>
+            </a:schemeClr>
+          </a:solidFill>
+          <a:ln>
+            <a:solidFill>
+              <a:schemeClr val="tx1"/>
+            </a:solidFill>
+          </a:ln>
+        </p:spPr>
+        <p:style>
+          <a:lnRef idx="2">
+            <a:schemeClr val="accent1">
+              <a:shade val="50000"/>
+            </a:schemeClr>
+          </a:lnRef>
+          <a:fillRef idx="1">
+            <a:schemeClr val="accent1"/>
+          </a:fillRef>
+          <a:effectRef idx="0">
+            <a:schemeClr val="accent1"/>
+          </a:effectRef>
+          <a:fontRef idx="minor">
+            <a:schemeClr val="lt1"/>
+          </a:fontRef>
+        </p:style>
+        <p:txBody>
+          <a:bodyPr rot="0" spcFirstLastPara="0" vertOverflow="overflow" horzOverflow="overflow" vert="horz" wrap="square" lIns="91440" tIns="45720" rIns="91440" bIns="45720" numCol="1" spcCol="0" rtlCol="0" fromWordArt="0" anchor="ctr" anchorCtr="0" forceAA="0" compatLnSpc="1">
+            <a:prstTxWarp prst="textNoShape">
+              <a:avLst/>
+            </a:prstTxWarp>
+            <a:noAutofit/>
+          </a:bodyPr>
+          <a:lstStyle/>
+          <a:p>
+            <a:pPr algn="ctr"/>
+            <a:r>
+              <a:rPr lang="en-US" dirty="0">
+                <a:solidFill>
+                  <a:schemeClr val="bg1"/>
+                </a:solidFill>
+              </a:rPr>
+              <a:t>Interest</a:t>
+            </a:r>
+          </a:p>
+        </p:txBody>
+      </p:sp>
+      <p:sp>
+        <p:nvSpPr>
+          <p:cNvPr id="12" name="Rectangle à coins arrondis 11"/>
+          <p:cNvSpPr/>
+          <p:nvPr/>
+        </p:nvSpPr>
+        <p:spPr>
+          <a:xfrm>
+            <a:off x="2533876" y="5156011"/>
+            <a:ext cx="1639229" cy="345688"/>
+          </a:xfrm>
+          <a:prstGeom prst="roundRect">
+            <a:avLst/>
+          </a:prstGeom>
+          <a:solidFill>
+            <a:schemeClr val="bg2">
+              <a:lumMod val="50000"/>
+            </a:schemeClr>
+          </a:solidFill>
+          <a:ln>
+            <a:solidFill>
+              <a:schemeClr val="tx1"/>
+            </a:solidFill>
+          </a:ln>
+        </p:spPr>
+        <p:style>
+          <a:lnRef idx="2">
+            <a:schemeClr val="accent1">
+              <a:shade val="50000"/>
+            </a:schemeClr>
+          </a:lnRef>
+          <a:fillRef idx="1">
+            <a:schemeClr val="accent1"/>
+          </a:fillRef>
+          <a:effectRef idx="0">
+            <a:schemeClr val="accent1"/>
+          </a:effectRef>
+          <a:fontRef idx="minor">
+            <a:schemeClr val="lt1"/>
+          </a:fontRef>
+        </p:style>
+        <p:txBody>
+          <a:bodyPr rot="0" spcFirstLastPara="0" vertOverflow="overflow" horzOverflow="overflow" vert="horz" wrap="square" lIns="91440" tIns="45720" rIns="91440" bIns="45720" numCol="1" spcCol="0" rtlCol="0" fromWordArt="0" anchor="ctr" anchorCtr="0" forceAA="0" compatLnSpc="1">
+            <a:prstTxWarp prst="textNoShape">
+              <a:avLst/>
+            </a:prstTxWarp>
+            <a:noAutofit/>
+          </a:bodyPr>
+          <a:lstStyle/>
+          <a:p>
+            <a:pPr algn="ctr"/>
+            <a:r>
+              <a:rPr lang="en-US" dirty="0">
+                <a:solidFill>
+                  <a:schemeClr val="bg1"/>
+                </a:solidFill>
+              </a:rPr>
+              <a:t>Support</a:t>
+            </a:r>
+          </a:p>
+        </p:txBody>
+      </p:sp>
+      <p:sp>
+        <p:nvSpPr>
+          <p:cNvPr id="13" name="Rectangle à coins arrondis 12"/>
+          <p:cNvSpPr/>
+          <p:nvPr/>
+        </p:nvSpPr>
+        <p:spPr>
+          <a:xfrm>
+            <a:off x="5998117" y="6346042"/>
+            <a:ext cx="1639229" cy="345688"/>
+          </a:xfrm>
+          <a:prstGeom prst="roundRect">
+            <a:avLst/>
+          </a:prstGeom>
+          <a:solidFill>
+            <a:schemeClr val="bg2">
+              <a:lumMod val="50000"/>
+            </a:schemeClr>
+          </a:solidFill>
+          <a:ln>
+            <a:solidFill>
+              <a:schemeClr val="tx1"/>
+            </a:solidFill>
+          </a:ln>
+        </p:spPr>
+        <p:style>
+          <a:lnRef idx="2">
+            <a:schemeClr val="accent1">
+              <a:shade val="50000"/>
+            </a:schemeClr>
+          </a:lnRef>
+          <a:fillRef idx="1">
+            <a:schemeClr val="accent1"/>
+          </a:fillRef>
+          <a:effectRef idx="0">
+            <a:schemeClr val="accent1"/>
+          </a:effectRef>
+          <a:fontRef idx="minor">
+            <a:schemeClr val="lt1"/>
+          </a:fontRef>
+        </p:style>
+        <p:txBody>
+          <a:bodyPr rot="0" spcFirstLastPara="0" vertOverflow="overflow" horzOverflow="overflow" vert="horz" wrap="square" lIns="91440" tIns="45720" rIns="91440" bIns="45720" numCol="1" spcCol="0" rtlCol="0" fromWordArt="0" anchor="ctr" anchorCtr="0" forceAA="0" compatLnSpc="1">
+            <a:prstTxWarp prst="textNoShape">
+              <a:avLst/>
+            </a:prstTxWarp>
+            <a:noAutofit/>
+          </a:bodyPr>
+          <a:lstStyle/>
+          <a:p>
+            <a:pPr algn="ctr"/>
+            <a:r>
+              <a:rPr lang="en-US" dirty="0">
+                <a:solidFill>
+                  <a:schemeClr val="bg1"/>
+                </a:solidFill>
+              </a:rPr>
+              <a:t>Action</a:t>
+            </a:r>
+          </a:p>
+        </p:txBody>
+      </p:sp>
+      <p:sp>
+        <p:nvSpPr>
+          <p:cNvPr id="19" name="ZoneTexte 18"/>
+          <p:cNvSpPr txBox="1"/>
+          <p:nvPr/>
+        </p:nvSpPr>
+        <p:spPr>
+          <a:xfrm>
+            <a:off x="5892224" y="142884"/>
+            <a:ext cx="2536118" cy="830997"/>
+          </a:xfrm>
+          <a:prstGeom prst="rect">
+            <a:avLst/>
+          </a:prstGeom>
+          <a:noFill/>
+        </p:spPr>
+        <p:txBody>
+          <a:bodyPr wrap="square" rtlCol="0">
+            <a:spAutoFit/>
+          </a:bodyPr>
+          <a:lstStyle/>
+          <a:p>
+            <a:r>
+              <a:rPr lang="en-US" sz="1600" i="1" dirty="0"/>
+              <a:t>The number of publications </a:t>
+            </a:r>
+            <a:r>
+              <a:rPr lang="en-US" sz="1600" i="1" dirty="0" smtClean="0"/>
+              <a:t>(fine-tuned </a:t>
+            </a:r>
+            <a:r>
+              <a:rPr lang="en-US" sz="1600" i="1" dirty="0"/>
+              <a:t>classification </a:t>
+            </a:r>
+            <a:r>
+              <a:rPr lang="en-US" sz="1600" i="1" dirty="0" smtClean="0"/>
+              <a:t>LLM predictions)</a:t>
+            </a:r>
+            <a:endParaRPr lang="en-US" sz="1600" i="1" dirty="0"/>
+          </a:p>
+        </p:txBody>
+      </p:sp>
+      <p:sp>
+        <p:nvSpPr>
+          <p:cNvPr id="20" name="ZoneTexte 19"/>
+          <p:cNvSpPr txBox="1"/>
+          <p:nvPr/>
+        </p:nvSpPr>
+        <p:spPr>
+          <a:xfrm>
+            <a:off x="10395680" y="4961256"/>
+            <a:ext cx="2251814" cy="1323439"/>
+          </a:xfrm>
+          <a:prstGeom prst="rect">
+            <a:avLst/>
+          </a:prstGeom>
+          <a:noFill/>
+          <a:ln>
+            <a:noFill/>
+            <a:prstDash val="sysDash"/>
+          </a:ln>
+        </p:spPr>
+        <p:txBody>
+          <a:bodyPr wrap="square" rtlCol="0">
+            <a:spAutoFit/>
+          </a:bodyPr>
+          <a:lstStyle/>
+          <a:p>
+            <a:r>
+              <a:rPr lang="en-US" sz="1600" i="1" dirty="0"/>
+              <a:t>The number of national legislation documents with ORO keyword matches (FAOLEX + ECOLEX databases)</a:t>
+            </a:r>
+          </a:p>
+        </p:txBody>
+      </p:sp>
+      <p:sp>
+        <p:nvSpPr>
+          <p:cNvPr id="21" name="ZoneTexte 20"/>
+          <p:cNvSpPr txBox="1"/>
+          <p:nvPr/>
+        </p:nvSpPr>
+        <p:spPr>
+          <a:xfrm>
+            <a:off x="10952175" y="2546841"/>
+            <a:ext cx="2251814" cy="1569660"/>
+          </a:xfrm>
+          <a:prstGeom prst="rect">
+            <a:avLst/>
+          </a:prstGeom>
+          <a:noFill/>
+        </p:spPr>
+        <p:txBody>
+          <a:bodyPr wrap="square" rtlCol="0">
+            <a:spAutoFit/>
+          </a:bodyPr>
+          <a:lstStyle/>
+          <a:p>
+            <a:r>
+              <a:rPr lang="en-US" sz="1600" i="1" dirty="0"/>
+              <a:t>The number of non-binding policy documents with ORO keyword matches (FAOLEX + ECOLEX databases)</a:t>
+            </a:r>
+          </a:p>
+        </p:txBody>
+      </p:sp>
+      <p:sp>
+        <p:nvSpPr>
+          <p:cNvPr id="22" name="ZoneTexte 21"/>
+          <p:cNvSpPr txBox="1"/>
+          <p:nvPr/>
+        </p:nvSpPr>
+        <p:spPr>
+          <a:xfrm>
+            <a:off x="533928" y="3416858"/>
+            <a:ext cx="1927722" cy="1077218"/>
+          </a:xfrm>
+          <a:prstGeom prst="rect">
+            <a:avLst/>
+          </a:prstGeom>
+          <a:noFill/>
+        </p:spPr>
+        <p:txBody>
+          <a:bodyPr wrap="square" rtlCol="0">
+            <a:spAutoFit/>
+          </a:bodyPr>
+          <a:lstStyle/>
+          <a:p>
+            <a:r>
+              <a:rPr lang="en-US" sz="1600" i="1" dirty="0"/>
+              <a:t>The number of social media posts returned from ORO keyword searches</a:t>
+            </a:r>
+          </a:p>
+        </p:txBody>
+      </p:sp>
+      <p:sp>
+        <p:nvSpPr>
+          <p:cNvPr id="23" name="ZoneTexte 22"/>
+          <p:cNvSpPr txBox="1"/>
+          <p:nvPr/>
+        </p:nvSpPr>
+        <p:spPr>
+          <a:xfrm>
+            <a:off x="553893" y="4888962"/>
+            <a:ext cx="1927722" cy="1569660"/>
+          </a:xfrm>
+          <a:prstGeom prst="rect">
+            <a:avLst/>
+          </a:prstGeom>
+          <a:noFill/>
+        </p:spPr>
+        <p:txBody>
+          <a:bodyPr wrap="square" rtlCol="0">
+            <a:spAutoFit/>
+          </a:bodyPr>
+          <a:lstStyle/>
+          <a:p>
+            <a:r>
+              <a:rPr lang="en-US" sz="1600" i="1" dirty="0"/>
+              <a:t>The number of social media posts + likes with positive sentiments returned from ORO keyword searches</a:t>
+            </a:r>
+          </a:p>
+        </p:txBody>
+      </p:sp>
+      <p:sp>
+        <p:nvSpPr>
+          <p:cNvPr id="24" name="ZoneTexte 23"/>
+          <p:cNvSpPr txBox="1"/>
+          <p:nvPr/>
+        </p:nvSpPr>
+        <p:spPr>
+          <a:xfrm>
+            <a:off x="7235400" y="1602242"/>
+            <a:ext cx="2730868" cy="739305"/>
+          </a:xfrm>
+          <a:prstGeom prst="rect">
+            <a:avLst/>
+          </a:prstGeom>
+          <a:noFill/>
+        </p:spPr>
+        <p:txBody>
+          <a:bodyPr wrap="square" rtlCol="0">
+            <a:spAutoFit/>
+          </a:bodyPr>
+          <a:lstStyle/>
+          <a:p>
+            <a:r>
+              <a:rPr lang="en-US" dirty="0" smtClean="0"/>
+              <a:t>The tractability </a:t>
+            </a:r>
+            <a:r>
+              <a:rPr lang="en-US" dirty="0"/>
+              <a:t>of the </a:t>
+            </a:r>
+            <a:r>
+              <a:rPr lang="en-US" dirty="0" smtClean="0"/>
+              <a:t>problem is researched</a:t>
+            </a:r>
+            <a:endParaRPr lang="en-US" dirty="0"/>
+          </a:p>
+        </p:txBody>
+      </p:sp>
+      <p:sp>
+        <p:nvSpPr>
+          <p:cNvPr id="25" name="ZoneTexte 24"/>
+          <p:cNvSpPr txBox="1"/>
+          <p:nvPr/>
+        </p:nvSpPr>
+        <p:spPr>
+          <a:xfrm>
+            <a:off x="8987445" y="3163424"/>
+            <a:ext cx="1957646" cy="739305"/>
+          </a:xfrm>
+          <a:prstGeom prst="rect">
+            <a:avLst/>
+          </a:prstGeom>
+          <a:noFill/>
+        </p:spPr>
+        <p:txBody>
+          <a:bodyPr wrap="square" rtlCol="0">
+            <a:spAutoFit/>
+          </a:bodyPr>
+          <a:lstStyle/>
+          <a:p>
+            <a:r>
+              <a:rPr lang="en-US" dirty="0" smtClean="0"/>
+              <a:t>Policy is formed (non-binding)</a:t>
+            </a:r>
+            <a:endParaRPr lang="en-US" dirty="0"/>
+          </a:p>
+        </p:txBody>
+      </p:sp>
+      <p:sp>
+        <p:nvSpPr>
+          <p:cNvPr id="26" name="ZoneTexte 25"/>
+          <p:cNvSpPr txBox="1"/>
+          <p:nvPr/>
+        </p:nvSpPr>
+        <p:spPr>
+          <a:xfrm>
+            <a:off x="8558643" y="5359768"/>
+            <a:ext cx="1929645" cy="1386277"/>
+          </a:xfrm>
+          <a:prstGeom prst="rect">
+            <a:avLst/>
+          </a:prstGeom>
+          <a:noFill/>
+        </p:spPr>
+        <p:txBody>
+          <a:bodyPr wrap="square" rtlCol="0">
+            <a:spAutoFit/>
+          </a:bodyPr>
+          <a:lstStyle/>
+          <a:p>
+            <a:r>
+              <a:rPr lang="en-US" dirty="0" smtClean="0"/>
+              <a:t>Outputs/ decisions of acting agencies (binding)</a:t>
+            </a:r>
+            <a:endParaRPr lang="en-US" dirty="0"/>
+          </a:p>
+        </p:txBody>
+      </p:sp>
+      <p:sp>
+        <p:nvSpPr>
+          <p:cNvPr id="27" name="ZoneTexte 26"/>
+          <p:cNvSpPr txBox="1"/>
+          <p:nvPr/>
+        </p:nvSpPr>
+        <p:spPr>
+          <a:xfrm>
+            <a:off x="5916984" y="6825292"/>
+            <a:ext cx="2359413" cy="739305"/>
+          </a:xfrm>
+          <a:prstGeom prst="rect">
+            <a:avLst/>
+          </a:prstGeom>
+          <a:noFill/>
+        </p:spPr>
+        <p:txBody>
+          <a:bodyPr wrap="square" rtlCol="0">
+            <a:spAutoFit/>
+          </a:bodyPr>
+          <a:lstStyle/>
+          <a:p>
+            <a:r>
+              <a:rPr lang="en-US" dirty="0"/>
+              <a:t>Compliance by target groups</a:t>
+            </a:r>
+          </a:p>
+        </p:txBody>
+      </p:sp>
+      <p:sp>
+        <p:nvSpPr>
+          <p:cNvPr id="28" name="ZoneTexte 27"/>
+          <p:cNvSpPr txBox="1"/>
+          <p:nvPr/>
+        </p:nvSpPr>
+        <p:spPr>
+          <a:xfrm>
+            <a:off x="4817314" y="1823451"/>
+            <a:ext cx="1397156" cy="739305"/>
+          </a:xfrm>
+          <a:prstGeom prst="rect">
+            <a:avLst/>
+          </a:prstGeom>
+          <a:noFill/>
+        </p:spPr>
+        <p:txBody>
+          <a:bodyPr wrap="square" rtlCol="0">
+            <a:spAutoFit/>
+          </a:bodyPr>
+          <a:lstStyle/>
+          <a:p>
+            <a:r>
+              <a:rPr lang="en-US" dirty="0" smtClean="0"/>
+              <a:t>Research on impacts</a:t>
+            </a:r>
+            <a:endParaRPr lang="en-US" dirty="0"/>
+          </a:p>
+        </p:txBody>
+      </p:sp>
+      <p:sp>
+        <p:nvSpPr>
+          <p:cNvPr id="29" name="ZoneTexte 28"/>
+          <p:cNvSpPr txBox="1"/>
+          <p:nvPr/>
+        </p:nvSpPr>
+        <p:spPr>
+          <a:xfrm>
+            <a:off x="2468733" y="4071447"/>
+            <a:ext cx="1864727" cy="415819"/>
+          </a:xfrm>
+          <a:prstGeom prst="rect">
+            <a:avLst/>
+          </a:prstGeom>
+          <a:noFill/>
+        </p:spPr>
+        <p:txBody>
+          <a:bodyPr wrap="square" rtlCol="0">
+            <a:spAutoFit/>
+          </a:bodyPr>
+          <a:lstStyle/>
+          <a:p>
+            <a:r>
+              <a:rPr lang="en-US" dirty="0" smtClean="0"/>
+              <a:t>Public interest</a:t>
+            </a:r>
+            <a:endParaRPr lang="en-US" dirty="0"/>
+          </a:p>
+        </p:txBody>
+      </p:sp>
+      <p:sp>
+        <p:nvSpPr>
+          <p:cNvPr id="30" name="Rectangle à coins arrondis 29"/>
+          <p:cNvSpPr/>
+          <p:nvPr/>
+        </p:nvSpPr>
+        <p:spPr>
+          <a:xfrm>
+            <a:off x="6784946" y="2082509"/>
+            <a:ext cx="401443" cy="401443"/>
+          </a:xfrm>
+          <a:prstGeom prst="roundRect">
+            <a:avLst/>
+          </a:prstGeom>
+          <a:solidFill>
+            <a:schemeClr val="bg1"/>
+          </a:solidFill>
+          <a:ln w="38100">
+            <a:solidFill>
+              <a:schemeClr val="tx1"/>
+            </a:solidFill>
+          </a:ln>
+        </p:spPr>
+        <p:style>
+          <a:lnRef idx="2">
+            <a:schemeClr val="accent1">
+              <a:shade val="50000"/>
+            </a:schemeClr>
+          </a:lnRef>
+          <a:fillRef idx="1">
+            <a:schemeClr val="accent1"/>
+          </a:fillRef>
+          <a:effectRef idx="0">
+            <a:schemeClr val="accent1"/>
+          </a:effectRef>
+          <a:fontRef idx="minor">
+            <a:schemeClr val="lt1"/>
+          </a:fontRef>
+        </p:style>
+        <p:txBody>
+          <a:bodyPr rot="0" spcFirstLastPara="0" vertOverflow="overflow" horzOverflow="overflow" vert="horz" wrap="square" lIns="91440" tIns="45720" rIns="91440" bIns="45720" numCol="1" spcCol="0" rtlCol="0" fromWordArt="0" anchor="ctr" anchorCtr="0" forceAA="0" compatLnSpc="1">
+            <a:prstTxWarp prst="textNoShape">
+              <a:avLst/>
+            </a:prstTxWarp>
+            <a:noAutofit/>
+          </a:bodyPr>
+          <a:lstStyle/>
+          <a:p>
+            <a:pPr algn="ctr"/>
+            <a:r>
+              <a:rPr lang="en-US" dirty="0" smtClean="0">
+                <a:solidFill>
+                  <a:schemeClr val="tx1"/>
+                </a:solidFill>
+              </a:rPr>
+              <a:t>1</a:t>
+            </a:r>
+            <a:endParaRPr lang="en-US" dirty="0">
+              <a:solidFill>
+                <a:schemeClr val="tx1"/>
+              </a:solidFill>
+            </a:endParaRPr>
+          </a:p>
+        </p:txBody>
+      </p:sp>
+      <p:sp>
+        <p:nvSpPr>
+          <p:cNvPr id="31" name="Rectangle à coins arrondis 30"/>
+          <p:cNvSpPr/>
+          <p:nvPr/>
+        </p:nvSpPr>
+        <p:spPr>
+          <a:xfrm>
+            <a:off x="8355277" y="3093113"/>
+            <a:ext cx="401443" cy="401443"/>
+          </a:xfrm>
+          <a:prstGeom prst="roundRect">
+            <a:avLst/>
+          </a:prstGeom>
+          <a:solidFill>
+            <a:schemeClr val="bg1"/>
+          </a:solidFill>
+          <a:ln w="38100">
+            <a:solidFill>
+              <a:schemeClr val="tx1"/>
+            </a:solidFill>
+          </a:ln>
+        </p:spPr>
+        <p:style>
+          <a:lnRef idx="2">
+            <a:schemeClr val="accent1">
+              <a:shade val="50000"/>
+            </a:schemeClr>
+          </a:lnRef>
+          <a:fillRef idx="1">
+            <a:schemeClr val="accent1"/>
+          </a:fillRef>
+          <a:effectRef idx="0">
+            <a:schemeClr val="accent1"/>
+          </a:effectRef>
+          <a:fontRef idx="minor">
+            <a:schemeClr val="lt1"/>
+          </a:fontRef>
+        </p:style>
+        <p:txBody>
+          <a:bodyPr rot="0" spcFirstLastPara="0" vertOverflow="overflow" horzOverflow="overflow" vert="horz" wrap="square" lIns="91440" tIns="45720" rIns="91440" bIns="45720" numCol="1" spcCol="0" rtlCol="0" fromWordArt="0" anchor="ctr" anchorCtr="0" forceAA="0" compatLnSpc="1">
+            <a:prstTxWarp prst="textNoShape">
+              <a:avLst/>
+            </a:prstTxWarp>
+            <a:noAutofit/>
+          </a:bodyPr>
+          <a:lstStyle/>
+          <a:p>
+            <a:pPr algn="ctr"/>
+            <a:r>
+              <a:rPr lang="en-US" dirty="0" smtClean="0">
+                <a:solidFill>
+                  <a:schemeClr val="tx1"/>
+                </a:solidFill>
+              </a:rPr>
+              <a:t>2</a:t>
+            </a:r>
+            <a:endParaRPr lang="en-US" dirty="0">
+              <a:solidFill>
+                <a:schemeClr val="tx1"/>
+              </a:solidFill>
+            </a:endParaRPr>
+          </a:p>
+        </p:txBody>
+      </p:sp>
+      <p:sp>
+        <p:nvSpPr>
+          <p:cNvPr id="32" name="Rectangle à coins arrondis 31"/>
+          <p:cNvSpPr/>
+          <p:nvPr/>
+        </p:nvSpPr>
+        <p:spPr>
+          <a:xfrm>
+            <a:off x="7953834" y="4986202"/>
+            <a:ext cx="401443" cy="401443"/>
+          </a:xfrm>
+          <a:prstGeom prst="roundRect">
+            <a:avLst/>
+          </a:prstGeom>
+          <a:solidFill>
+            <a:schemeClr val="bg1"/>
+          </a:solidFill>
+          <a:ln w="38100">
+            <a:solidFill>
+              <a:schemeClr val="tx1"/>
+            </a:solidFill>
+          </a:ln>
+        </p:spPr>
+        <p:style>
+          <a:lnRef idx="2">
+            <a:schemeClr val="accent1">
+              <a:shade val="50000"/>
+            </a:schemeClr>
+          </a:lnRef>
+          <a:fillRef idx="1">
+            <a:schemeClr val="accent1"/>
+          </a:fillRef>
+          <a:effectRef idx="0">
+            <a:schemeClr val="accent1"/>
+          </a:effectRef>
+          <a:fontRef idx="minor">
+            <a:schemeClr val="lt1"/>
+          </a:fontRef>
+        </p:style>
+        <p:txBody>
+          <a:bodyPr rot="0" spcFirstLastPara="0" vertOverflow="overflow" horzOverflow="overflow" vert="horz" wrap="square" lIns="91440" tIns="45720" rIns="91440" bIns="45720" numCol="1" spcCol="0" rtlCol="0" fromWordArt="0" anchor="ctr" anchorCtr="0" forceAA="0" compatLnSpc="1">
+            <a:prstTxWarp prst="textNoShape">
+              <a:avLst/>
+            </a:prstTxWarp>
+            <a:noAutofit/>
+          </a:bodyPr>
+          <a:lstStyle/>
+          <a:p>
+            <a:pPr algn="ctr"/>
+            <a:r>
+              <a:rPr lang="en-US" dirty="0" smtClean="0">
+                <a:solidFill>
+                  <a:schemeClr val="tx1"/>
+                </a:solidFill>
+              </a:rPr>
+              <a:t>3</a:t>
+            </a:r>
+            <a:endParaRPr lang="en-US" dirty="0">
+              <a:solidFill>
+                <a:schemeClr val="tx1"/>
+              </a:solidFill>
+            </a:endParaRPr>
+          </a:p>
+        </p:txBody>
+      </p:sp>
+      <p:sp>
+        <p:nvSpPr>
+          <p:cNvPr id="33" name="Rectangle à coins arrondis 32"/>
+          <p:cNvSpPr/>
+          <p:nvPr/>
+        </p:nvSpPr>
+        <p:spPr>
+          <a:xfrm>
+            <a:off x="6587084" y="5764344"/>
+            <a:ext cx="401443" cy="401443"/>
+          </a:xfrm>
+          <a:prstGeom prst="roundRect">
+            <a:avLst/>
+          </a:prstGeom>
+          <a:solidFill>
+            <a:schemeClr val="bg1"/>
+          </a:solidFill>
+          <a:ln w="38100">
+            <a:solidFill>
+              <a:schemeClr val="tx1"/>
+            </a:solidFill>
+          </a:ln>
+        </p:spPr>
+        <p:style>
+          <a:lnRef idx="2">
+            <a:schemeClr val="accent1">
+              <a:shade val="50000"/>
+            </a:schemeClr>
+          </a:lnRef>
+          <a:fillRef idx="1">
+            <a:schemeClr val="accent1"/>
+          </a:fillRef>
+          <a:effectRef idx="0">
+            <a:schemeClr val="accent1"/>
+          </a:effectRef>
+          <a:fontRef idx="minor">
+            <a:schemeClr val="lt1"/>
+          </a:fontRef>
+        </p:style>
+        <p:txBody>
+          <a:bodyPr rot="0" spcFirstLastPara="0" vertOverflow="overflow" horzOverflow="overflow" vert="horz" wrap="square" lIns="91440" tIns="45720" rIns="91440" bIns="45720" numCol="1" spcCol="0" rtlCol="0" fromWordArt="0" anchor="ctr" anchorCtr="0" forceAA="0" compatLnSpc="1">
+            <a:prstTxWarp prst="textNoShape">
+              <a:avLst/>
+            </a:prstTxWarp>
+            <a:noAutofit/>
+          </a:bodyPr>
+          <a:lstStyle/>
+          <a:p>
+            <a:pPr algn="ctr"/>
+            <a:r>
+              <a:rPr lang="en-US" dirty="0" smtClean="0">
+                <a:solidFill>
+                  <a:schemeClr val="tx1"/>
+                </a:solidFill>
+              </a:rPr>
+              <a:t>4</a:t>
+            </a:r>
+            <a:endParaRPr lang="en-US" dirty="0">
+              <a:solidFill>
+                <a:schemeClr val="tx1"/>
+              </a:solidFill>
+            </a:endParaRPr>
+          </a:p>
+        </p:txBody>
+      </p:sp>
+      <p:sp>
+        <p:nvSpPr>
+          <p:cNvPr id="35" name="Rectangle à coins arrondis 34"/>
+          <p:cNvSpPr/>
+          <p:nvPr/>
+        </p:nvSpPr>
+        <p:spPr>
+          <a:xfrm>
+            <a:off x="5253592" y="2763575"/>
+            <a:ext cx="401443" cy="401443"/>
+          </a:xfrm>
+          <a:prstGeom prst="roundRect">
+            <a:avLst/>
+          </a:prstGeom>
+          <a:solidFill>
+            <a:schemeClr val="bg1"/>
+          </a:solidFill>
+          <a:ln w="38100">
+            <a:solidFill>
+              <a:schemeClr val="tx1"/>
+            </a:solidFill>
+            <a:prstDash val="solid"/>
+          </a:ln>
+        </p:spPr>
+        <p:style>
+          <a:lnRef idx="2">
+            <a:schemeClr val="accent1">
+              <a:shade val="50000"/>
+            </a:schemeClr>
+          </a:lnRef>
+          <a:fillRef idx="1">
+            <a:schemeClr val="accent1"/>
+          </a:fillRef>
+          <a:effectRef idx="0">
+            <a:schemeClr val="accent1"/>
+          </a:effectRef>
+          <a:fontRef idx="minor">
+            <a:schemeClr val="lt1"/>
+          </a:fontRef>
+        </p:style>
+        <p:txBody>
+          <a:bodyPr rot="0" spcFirstLastPara="0" vertOverflow="overflow" horzOverflow="overflow" vert="horz" wrap="square" lIns="91440" tIns="45720" rIns="91440" bIns="45720" numCol="1" spcCol="0" rtlCol="0" fromWordArt="0" anchor="ctr" anchorCtr="0" forceAA="0" compatLnSpc="1">
+            <a:prstTxWarp prst="textNoShape">
+              <a:avLst/>
+            </a:prstTxWarp>
+            <a:noAutofit/>
+          </a:bodyPr>
+          <a:lstStyle/>
+          <a:p>
+            <a:pPr algn="ctr"/>
+            <a:r>
+              <a:rPr lang="en-US" dirty="0" smtClean="0">
+                <a:solidFill>
+                  <a:schemeClr val="tx1"/>
+                </a:solidFill>
+              </a:rPr>
+              <a:t>5</a:t>
+            </a:r>
+            <a:endParaRPr lang="en-US" dirty="0">
+              <a:solidFill>
+                <a:schemeClr val="tx1"/>
+              </a:solidFill>
+            </a:endParaRPr>
+          </a:p>
+        </p:txBody>
+      </p:sp>
+      <p:sp>
+        <p:nvSpPr>
+          <p:cNvPr id="36" name="ZoneTexte 35"/>
+          <p:cNvSpPr txBox="1"/>
+          <p:nvPr/>
+        </p:nvSpPr>
+        <p:spPr>
+          <a:xfrm>
+            <a:off x="5916984" y="7693888"/>
+            <a:ext cx="1731455" cy="338554"/>
+          </a:xfrm>
+          <a:prstGeom prst="rect">
+            <a:avLst/>
+          </a:prstGeom>
+          <a:noFill/>
+        </p:spPr>
+        <p:txBody>
+          <a:bodyPr wrap="square" rtlCol="0">
+            <a:spAutoFit/>
+          </a:bodyPr>
+          <a:lstStyle/>
+          <a:p>
+            <a:r>
+              <a:rPr lang="en-US" sz="1600" i="1" dirty="0" smtClean="0"/>
+              <a:t>Various metrics</a:t>
+            </a:r>
+            <a:endParaRPr lang="en-US" sz="1600" i="1" dirty="0"/>
+          </a:p>
+        </p:txBody>
+      </p:sp>
+      <p:sp>
+        <p:nvSpPr>
+          <p:cNvPr id="38" name="Rectangle à coins arrondis 37"/>
+          <p:cNvSpPr/>
+          <p:nvPr/>
+        </p:nvSpPr>
+        <p:spPr>
+          <a:xfrm>
+            <a:off x="827497" y="1057133"/>
+            <a:ext cx="291095" cy="291095"/>
+          </a:xfrm>
+          <a:prstGeom prst="roundRect">
+            <a:avLst/>
+          </a:prstGeom>
+          <a:solidFill>
+            <a:schemeClr val="bg1"/>
+          </a:solidFill>
+          <a:ln w="38100">
+            <a:solidFill>
+              <a:schemeClr val="tx1"/>
+            </a:solidFill>
+          </a:ln>
+        </p:spPr>
+        <p:style>
+          <a:lnRef idx="2">
+            <a:schemeClr val="accent1">
+              <a:shade val="50000"/>
+            </a:schemeClr>
+          </a:lnRef>
+          <a:fillRef idx="1">
+            <a:schemeClr val="accent1"/>
+          </a:fillRef>
+          <a:effectRef idx="0">
+            <a:schemeClr val="accent1"/>
+          </a:effectRef>
+          <a:fontRef idx="minor">
+            <a:schemeClr val="lt1"/>
+          </a:fontRef>
+        </p:style>
+        <p:txBody>
+          <a:bodyPr rtlCol="0" anchor="ctr"/>
+          <a:lstStyle/>
+          <a:p>
+            <a:pPr algn="ctr"/>
+            <a:endParaRPr lang="en-US"/>
+          </a:p>
+        </p:txBody>
+      </p:sp>
+      <p:sp>
+        <p:nvSpPr>
+          <p:cNvPr id="39" name="ZoneTexte 38"/>
+          <p:cNvSpPr txBox="1"/>
+          <p:nvPr/>
+        </p:nvSpPr>
+        <p:spPr>
+          <a:xfrm>
+            <a:off x="1225685" y="1058718"/>
+            <a:ext cx="1308192" cy="369332"/>
+          </a:xfrm>
+          <a:prstGeom prst="rect">
+            <a:avLst/>
+          </a:prstGeom>
+          <a:noFill/>
+        </p:spPr>
+        <p:txBody>
+          <a:bodyPr wrap="square" rtlCol="0">
+            <a:spAutoFit/>
+          </a:bodyPr>
+          <a:lstStyle/>
+          <a:p>
+            <a:r>
+              <a:rPr lang="en-US" sz="1800" dirty="0" smtClean="0"/>
+              <a:t>Node</a:t>
+            </a:r>
+            <a:endParaRPr lang="en-US" sz="1800" dirty="0"/>
+          </a:p>
+        </p:txBody>
+      </p:sp>
+      <p:sp>
+        <p:nvSpPr>
+          <p:cNvPr id="43" name="ZoneTexte 42"/>
+          <p:cNvSpPr txBox="1"/>
+          <p:nvPr/>
+        </p:nvSpPr>
+        <p:spPr>
+          <a:xfrm>
+            <a:off x="1161653" y="1859702"/>
+            <a:ext cx="902357" cy="369332"/>
+          </a:xfrm>
+          <a:prstGeom prst="rect">
+            <a:avLst/>
+          </a:prstGeom>
+          <a:noFill/>
+        </p:spPr>
+        <p:txBody>
+          <a:bodyPr wrap="square" rtlCol="0">
+            <a:spAutoFit/>
+          </a:bodyPr>
+          <a:lstStyle/>
+          <a:p>
+            <a:r>
+              <a:rPr lang="en-US" sz="1800" dirty="0" smtClean="0"/>
+              <a:t>Metric</a:t>
+            </a:r>
+            <a:endParaRPr lang="en-US" sz="1800" dirty="0"/>
+          </a:p>
+        </p:txBody>
+      </p:sp>
+      <p:cxnSp>
+        <p:nvCxnSpPr>
+          <p:cNvPr id="55" name="Connecteur droit avec flèche 54"/>
+          <p:cNvCxnSpPr/>
+          <p:nvPr/>
+        </p:nvCxnSpPr>
+        <p:spPr>
+          <a:xfrm>
+            <a:off x="7127599" y="2425162"/>
+            <a:ext cx="1286468" cy="726741"/>
+          </a:xfrm>
+          <a:prstGeom prst="straightConnector1">
+            <a:avLst/>
+          </a:prstGeom>
+          <a:ln>
+            <a:solidFill>
+              <a:schemeClr val="tx1"/>
+            </a:solidFill>
+            <a:tailEnd type="triangle" w="lg" len="lg"/>
+          </a:ln>
+        </p:spPr>
+        <p:style>
+          <a:lnRef idx="1">
+            <a:schemeClr val="accent1"/>
+          </a:lnRef>
+          <a:fillRef idx="0">
+            <a:schemeClr val="accent1"/>
+          </a:fillRef>
+          <a:effectRef idx="0">
+            <a:schemeClr val="accent1"/>
+          </a:effectRef>
+          <a:fontRef idx="minor">
+            <a:schemeClr val="tx1"/>
+          </a:fontRef>
+        </p:style>
+      </p:cxnSp>
+      <p:cxnSp>
+        <p:nvCxnSpPr>
+          <p:cNvPr id="56" name="Connecteur droit avec flèche 55"/>
+          <p:cNvCxnSpPr/>
+          <p:nvPr/>
+        </p:nvCxnSpPr>
+        <p:spPr>
+          <a:xfrm flipH="1">
+            <a:off x="8154556" y="3494556"/>
+            <a:ext cx="401443" cy="1491646"/>
+          </a:xfrm>
+          <a:prstGeom prst="straightConnector1">
+            <a:avLst/>
+          </a:prstGeom>
+          <a:ln>
+            <a:solidFill>
+              <a:schemeClr val="tx1"/>
+            </a:solidFill>
+            <a:tailEnd type="triangle" w="lg" len="lg"/>
+          </a:ln>
+        </p:spPr>
+        <p:style>
+          <a:lnRef idx="1">
+            <a:schemeClr val="accent1"/>
+          </a:lnRef>
+          <a:fillRef idx="0">
+            <a:schemeClr val="accent1"/>
+          </a:fillRef>
+          <a:effectRef idx="0">
+            <a:schemeClr val="accent1"/>
+          </a:effectRef>
+          <a:fontRef idx="minor">
+            <a:schemeClr val="tx1"/>
+          </a:fontRef>
+        </p:style>
+      </p:cxnSp>
+      <p:cxnSp>
+        <p:nvCxnSpPr>
+          <p:cNvPr id="59" name="Connecteur droit avec flèche 58"/>
+          <p:cNvCxnSpPr/>
+          <p:nvPr/>
+        </p:nvCxnSpPr>
+        <p:spPr>
+          <a:xfrm flipH="1">
+            <a:off x="6929737" y="5328855"/>
+            <a:ext cx="1082887" cy="494279"/>
+          </a:xfrm>
+          <a:prstGeom prst="straightConnector1">
+            <a:avLst/>
+          </a:prstGeom>
+          <a:ln>
+            <a:solidFill>
+              <a:schemeClr val="tx1"/>
+            </a:solidFill>
+            <a:tailEnd type="triangle" w="lg" len="lg"/>
+          </a:ln>
+        </p:spPr>
+        <p:style>
+          <a:lnRef idx="1">
+            <a:schemeClr val="accent1"/>
+          </a:lnRef>
+          <a:fillRef idx="0">
+            <a:schemeClr val="accent1"/>
+          </a:fillRef>
+          <a:effectRef idx="0">
+            <a:schemeClr val="accent1"/>
+          </a:effectRef>
+          <a:fontRef idx="minor">
+            <a:schemeClr val="tx1"/>
+          </a:fontRef>
+        </p:style>
+      </p:cxnSp>
+      <p:cxnSp>
+        <p:nvCxnSpPr>
+          <p:cNvPr id="62" name="Connecteur droit avec flèche 61"/>
+          <p:cNvCxnSpPr/>
+          <p:nvPr/>
+        </p:nvCxnSpPr>
+        <p:spPr>
+          <a:xfrm flipH="1" flipV="1">
+            <a:off x="5454314" y="3165018"/>
+            <a:ext cx="1191560" cy="2658116"/>
+          </a:xfrm>
+          <a:prstGeom prst="straightConnector1">
+            <a:avLst/>
+          </a:prstGeom>
+          <a:ln>
+            <a:solidFill>
+              <a:schemeClr val="tx1"/>
+            </a:solidFill>
+            <a:tailEnd type="triangle" w="lg" len="lg"/>
+          </a:ln>
+        </p:spPr>
+        <p:style>
+          <a:lnRef idx="1">
+            <a:schemeClr val="accent1"/>
+          </a:lnRef>
+          <a:fillRef idx="0">
+            <a:schemeClr val="accent1"/>
+          </a:fillRef>
+          <a:effectRef idx="0">
+            <a:schemeClr val="accent1"/>
+          </a:effectRef>
+          <a:fontRef idx="minor">
+            <a:schemeClr val="tx1"/>
+          </a:fontRef>
+        </p:style>
+      </p:cxnSp>
+      <p:cxnSp>
+        <p:nvCxnSpPr>
+          <p:cNvPr id="68" name="Connecteur droit avec flèche 67"/>
+          <p:cNvCxnSpPr/>
+          <p:nvPr/>
+        </p:nvCxnSpPr>
+        <p:spPr>
+          <a:xfrm flipV="1">
+            <a:off x="5596245" y="2283231"/>
+            <a:ext cx="1188701" cy="539134"/>
+          </a:xfrm>
+          <a:prstGeom prst="straightConnector1">
+            <a:avLst/>
+          </a:prstGeom>
+          <a:ln>
+            <a:solidFill>
+              <a:schemeClr val="tx1"/>
+            </a:solidFill>
+            <a:tailEnd type="triangle" w="lg" len="lg"/>
+          </a:ln>
+        </p:spPr>
+        <p:style>
+          <a:lnRef idx="1">
+            <a:schemeClr val="accent1"/>
+          </a:lnRef>
+          <a:fillRef idx="0">
+            <a:schemeClr val="accent1"/>
+          </a:fillRef>
+          <a:effectRef idx="0">
+            <a:schemeClr val="accent1"/>
+          </a:effectRef>
+          <a:fontRef idx="minor">
+            <a:schemeClr val="tx1"/>
+          </a:fontRef>
+        </p:style>
+      </p:cxnSp>
+      <p:cxnSp>
+        <p:nvCxnSpPr>
+          <p:cNvPr id="74" name="Connecteur droit avec flèche 73"/>
+          <p:cNvCxnSpPr/>
+          <p:nvPr/>
+        </p:nvCxnSpPr>
+        <p:spPr>
+          <a:xfrm flipV="1">
+            <a:off x="747985" y="1538292"/>
+            <a:ext cx="398187" cy="87688"/>
+          </a:xfrm>
+          <a:prstGeom prst="straightConnector1">
+            <a:avLst/>
+          </a:prstGeom>
+          <a:ln>
+            <a:solidFill>
+              <a:schemeClr val="tx1"/>
+            </a:solidFill>
+            <a:tailEnd type="triangle" w="lg" len="lg"/>
+          </a:ln>
+        </p:spPr>
+        <p:style>
+          <a:lnRef idx="1">
+            <a:schemeClr val="accent1"/>
+          </a:lnRef>
+          <a:fillRef idx="0">
+            <a:schemeClr val="accent1"/>
+          </a:fillRef>
+          <a:effectRef idx="0">
+            <a:schemeClr val="accent1"/>
+          </a:effectRef>
+          <a:fontRef idx="minor">
+            <a:schemeClr val="tx1"/>
+          </a:fontRef>
+        </p:style>
+      </p:cxnSp>
+      <p:sp>
+        <p:nvSpPr>
+          <p:cNvPr id="76" name="ZoneTexte 75"/>
+          <p:cNvSpPr txBox="1"/>
+          <p:nvPr/>
+        </p:nvSpPr>
+        <p:spPr>
+          <a:xfrm>
+            <a:off x="1225685" y="1448940"/>
+            <a:ext cx="941418" cy="373996"/>
+          </a:xfrm>
+          <a:prstGeom prst="rect">
+            <a:avLst/>
+          </a:prstGeom>
+          <a:noFill/>
+        </p:spPr>
+        <p:txBody>
+          <a:bodyPr wrap="square" rtlCol="0">
+            <a:spAutoFit/>
+          </a:bodyPr>
+          <a:lstStyle/>
+          <a:p>
+            <a:r>
+              <a:rPr lang="en-US" sz="1800" dirty="0" smtClean="0"/>
+              <a:t>Edge</a:t>
+            </a:r>
+            <a:endParaRPr lang="en-US" sz="1800" dirty="0"/>
+          </a:p>
+        </p:txBody>
+      </p:sp>
+      <p:sp>
+        <p:nvSpPr>
+          <p:cNvPr id="77" name="Rectangle à coins arrondis 76"/>
+          <p:cNvSpPr/>
+          <p:nvPr/>
+        </p:nvSpPr>
+        <p:spPr>
+          <a:xfrm>
+            <a:off x="9047229" y="2666827"/>
+            <a:ext cx="1639229" cy="345688"/>
+          </a:xfrm>
+          <a:prstGeom prst="roundRect">
+            <a:avLst/>
+          </a:prstGeom>
+          <a:solidFill>
+            <a:schemeClr val="bg2">
+              <a:lumMod val="50000"/>
+            </a:schemeClr>
+          </a:solidFill>
+          <a:ln>
+            <a:solidFill>
+              <a:schemeClr val="tx1"/>
+            </a:solidFill>
+          </a:ln>
+        </p:spPr>
+        <p:style>
+          <a:lnRef idx="2">
+            <a:schemeClr val="accent1">
+              <a:shade val="50000"/>
+            </a:schemeClr>
+          </a:lnRef>
+          <a:fillRef idx="1">
+            <a:schemeClr val="accent1"/>
+          </a:fillRef>
+          <a:effectRef idx="0">
+            <a:schemeClr val="accent1"/>
+          </a:effectRef>
+          <a:fontRef idx="minor">
+            <a:schemeClr val="lt1"/>
+          </a:fontRef>
+        </p:style>
+        <p:txBody>
+          <a:bodyPr rot="0" spcFirstLastPara="0" vertOverflow="overflow" horzOverflow="overflow" vert="horz" wrap="square" lIns="91440" tIns="45720" rIns="91440" bIns="45720" numCol="1" spcCol="0" rtlCol="0" fromWordArt="0" anchor="ctr" anchorCtr="0" forceAA="0" compatLnSpc="1">
+            <a:prstTxWarp prst="textNoShape">
+              <a:avLst/>
+            </a:prstTxWarp>
+            <a:noAutofit/>
+          </a:bodyPr>
+          <a:lstStyle/>
+          <a:p>
+            <a:pPr algn="ctr"/>
+            <a:r>
+              <a:rPr lang="en-US" dirty="0">
+                <a:solidFill>
+                  <a:schemeClr val="bg1"/>
+                </a:solidFill>
+              </a:rPr>
+              <a:t>Policy</a:t>
+            </a:r>
+          </a:p>
+        </p:txBody>
+      </p:sp>
+      <p:sp>
+        <p:nvSpPr>
+          <p:cNvPr id="78" name="Rectangle à coins arrondis 77"/>
+          <p:cNvSpPr/>
+          <p:nvPr/>
+        </p:nvSpPr>
+        <p:spPr>
+          <a:xfrm>
+            <a:off x="4516907" y="3670004"/>
+            <a:ext cx="401443" cy="401443"/>
+          </a:xfrm>
+          <a:prstGeom prst="roundRect">
+            <a:avLst/>
+          </a:prstGeom>
+          <a:solidFill>
+            <a:schemeClr val="bg1"/>
+          </a:solidFill>
+          <a:ln w="38100">
+            <a:solidFill>
+              <a:schemeClr val="tx1"/>
+            </a:solidFill>
+          </a:ln>
+        </p:spPr>
+        <p:style>
+          <a:lnRef idx="2">
+            <a:schemeClr val="accent1">
+              <a:shade val="50000"/>
+            </a:schemeClr>
+          </a:lnRef>
+          <a:fillRef idx="1">
+            <a:schemeClr val="accent1"/>
+          </a:fillRef>
+          <a:effectRef idx="0">
+            <a:schemeClr val="accent1"/>
+          </a:effectRef>
+          <a:fontRef idx="minor">
+            <a:schemeClr val="lt1"/>
+          </a:fontRef>
+        </p:style>
+        <p:txBody>
+          <a:bodyPr rot="0" spcFirstLastPara="0" vertOverflow="overflow" horzOverflow="overflow" vert="horz" wrap="square" lIns="91440" tIns="45720" rIns="91440" bIns="45720" numCol="1" spcCol="0" rtlCol="0" fromWordArt="0" anchor="ctr" anchorCtr="0" forceAA="0" compatLnSpc="1">
+            <a:prstTxWarp prst="textNoShape">
+              <a:avLst/>
+            </a:prstTxWarp>
+            <a:noAutofit/>
+          </a:bodyPr>
+          <a:lstStyle/>
+          <a:p>
+            <a:pPr algn="ctr"/>
+            <a:r>
+              <a:rPr lang="en-US" dirty="0">
+                <a:solidFill>
+                  <a:schemeClr val="tx1"/>
+                </a:solidFill>
+              </a:rPr>
+              <a:t>?</a:t>
+            </a:r>
+          </a:p>
+        </p:txBody>
+      </p:sp>
+      <p:sp>
+        <p:nvSpPr>
+          <p:cNvPr id="79" name="Rectangle à coins arrondis 78"/>
+          <p:cNvSpPr/>
+          <p:nvPr/>
+        </p:nvSpPr>
+        <p:spPr>
+          <a:xfrm>
+            <a:off x="4693166" y="5094231"/>
+            <a:ext cx="401443" cy="401443"/>
+          </a:xfrm>
+          <a:prstGeom prst="roundRect">
+            <a:avLst/>
+          </a:prstGeom>
+          <a:solidFill>
+            <a:schemeClr val="bg1"/>
+          </a:solidFill>
+          <a:ln w="38100">
+            <a:solidFill>
+              <a:schemeClr val="tx1"/>
+            </a:solidFill>
+          </a:ln>
+        </p:spPr>
+        <p:style>
+          <a:lnRef idx="2">
+            <a:schemeClr val="accent1">
+              <a:shade val="50000"/>
+            </a:schemeClr>
+          </a:lnRef>
+          <a:fillRef idx="1">
+            <a:schemeClr val="accent1"/>
+          </a:fillRef>
+          <a:effectRef idx="0">
+            <a:schemeClr val="accent1"/>
+          </a:effectRef>
+          <a:fontRef idx="minor">
+            <a:schemeClr val="lt1"/>
+          </a:fontRef>
+        </p:style>
+        <p:txBody>
+          <a:bodyPr rot="0" spcFirstLastPara="0" vertOverflow="overflow" horzOverflow="overflow" vert="horz" wrap="square" lIns="91440" tIns="45720" rIns="91440" bIns="45720" numCol="1" spcCol="0" rtlCol="0" fromWordArt="0" anchor="ctr" anchorCtr="0" forceAA="0" compatLnSpc="1">
+            <a:prstTxWarp prst="textNoShape">
+              <a:avLst/>
+            </a:prstTxWarp>
+            <a:noAutofit/>
+          </a:bodyPr>
+          <a:lstStyle/>
+          <a:p>
+            <a:pPr algn="ctr"/>
+            <a:r>
+              <a:rPr lang="en-US" dirty="0">
+                <a:solidFill>
+                  <a:schemeClr val="tx1"/>
+                </a:solidFill>
+              </a:rPr>
+              <a:t>?</a:t>
+            </a:r>
+          </a:p>
+        </p:txBody>
+      </p:sp>
+      <p:sp>
+        <p:nvSpPr>
+          <p:cNvPr id="80" name="ZoneTexte 79"/>
+          <p:cNvSpPr txBox="1"/>
+          <p:nvPr/>
+        </p:nvSpPr>
+        <p:spPr>
+          <a:xfrm>
+            <a:off x="2448180" y="5603885"/>
+            <a:ext cx="1864727" cy="415819"/>
+          </a:xfrm>
+          <a:prstGeom prst="rect">
+            <a:avLst/>
+          </a:prstGeom>
+          <a:noFill/>
+        </p:spPr>
+        <p:txBody>
+          <a:bodyPr wrap="square" rtlCol="0">
+            <a:spAutoFit/>
+          </a:bodyPr>
+          <a:lstStyle/>
+          <a:p>
+            <a:r>
+              <a:rPr lang="en-US" dirty="0" smtClean="0"/>
+              <a:t>Public support</a:t>
+            </a:r>
+            <a:endParaRPr lang="en-US" dirty="0"/>
+          </a:p>
+        </p:txBody>
+      </p:sp>
+      <p:sp>
+        <p:nvSpPr>
+          <p:cNvPr id="81" name="ZoneTexte 80"/>
+          <p:cNvSpPr txBox="1"/>
+          <p:nvPr/>
+        </p:nvSpPr>
+        <p:spPr>
+          <a:xfrm>
+            <a:off x="781494" y="463968"/>
+            <a:ext cx="984885" cy="415819"/>
+          </a:xfrm>
+          <a:prstGeom prst="rect">
+            <a:avLst/>
+          </a:prstGeom>
+          <a:noFill/>
+        </p:spPr>
+        <p:txBody>
+          <a:bodyPr wrap="none" rtlCol="0">
+            <a:spAutoFit/>
+          </a:bodyPr>
+          <a:lstStyle/>
+          <a:p>
+            <a:r>
+              <a:rPr lang="en-US" b="1" dirty="0" smtClean="0"/>
+              <a:t>Legend</a:t>
+            </a:r>
+            <a:endParaRPr lang="en-US" b="1" dirty="0"/>
+          </a:p>
+        </p:txBody>
+      </p:sp>
+      <p:sp>
+        <p:nvSpPr>
+          <p:cNvPr id="41" name="Rectangle à coins arrondis 40"/>
+          <p:cNvSpPr/>
+          <p:nvPr/>
+        </p:nvSpPr>
+        <p:spPr>
+          <a:xfrm>
+            <a:off x="821547" y="1857227"/>
+            <a:ext cx="291095" cy="291095"/>
+          </a:xfrm>
+          <a:prstGeom prst="roundRect">
+            <a:avLst/>
+          </a:prstGeom>
+          <a:solidFill>
+            <a:schemeClr val="bg2">
+              <a:lumMod val="50000"/>
+            </a:schemeClr>
+          </a:solidFill>
+          <a:ln w="38100">
+            <a:solidFill>
+              <a:schemeClr val="tx1"/>
+            </a:solidFill>
+          </a:ln>
+        </p:spPr>
+        <p:style>
+          <a:lnRef idx="2">
+            <a:schemeClr val="accent1">
+              <a:shade val="50000"/>
+            </a:schemeClr>
+          </a:lnRef>
+          <a:fillRef idx="1">
+            <a:schemeClr val="accent1"/>
+          </a:fillRef>
+          <a:effectRef idx="0">
+            <a:schemeClr val="accent1"/>
+          </a:effectRef>
+          <a:fontRef idx="minor">
+            <a:schemeClr val="lt1"/>
+          </a:fontRef>
+        </p:style>
+        <p:txBody>
+          <a:bodyPr rtlCol="0" anchor="ctr"/>
+          <a:lstStyle/>
+          <a:p>
+            <a:pPr algn="ctr"/>
+            <a:endParaRPr lang="en-US"/>
+          </a:p>
+        </p:txBody>
+      </p:sp>
+    </p:spTree>
+    <p:extLst>
+      <p:ext uri="{BB962C8B-B14F-4D97-AF65-F5344CB8AC3E}">
+        <p14:creationId xmlns:p14="http://schemas.microsoft.com/office/powerpoint/2010/main" val="2096939287"/>
+      </p:ext>
+    </p:extLst>
+  </p:cSld>
+  <p:clrMapOvr>
+    <a:masterClrMapping/>
+  </p:clrMapOvr>
+</p:sld>
+</file>
+
+<file path=ppt/slides/slide2.xml><?xml version="1.0" encoding="utf-8"?>
+<p:sld xmlns:a="http://schemas.openxmlformats.org/drawingml/2006/main" xmlns:r="http://schemas.openxmlformats.org/officeDocument/2006/relationships" xmlns:p="http://schemas.openxmlformats.org/presentationml/2006/main">
+  <p:cSld>
+    <p:spTree>
+      <p:nvGrpSpPr>
+        <p:cNvPr id="1" name=""/>
+        <p:cNvGrpSpPr/>
+        <p:nvPr/>
+      </p:nvGrpSpPr>
+      <p:grpSpPr>
+        <a:xfrm>
+          <a:off x="0" y="0"/>
+          <a:ext cx="0" cy="0"/>
+          <a:chOff x="0" y="0"/>
+          <a:chExt cx="0" cy="0"/>
+        </a:xfrm>
+      </p:grpSpPr>
+      <p:sp>
+        <p:nvSpPr>
+          <p:cNvPr id="8" name="Rectangle à coins arrondis 7"/>
+          <p:cNvSpPr/>
+          <p:nvPr/>
+        </p:nvSpPr>
+        <p:spPr>
+          <a:xfrm>
+            <a:off x="5892224" y="1098327"/>
+            <a:ext cx="2186885" cy="371392"/>
+          </a:xfrm>
+          <a:prstGeom prst="roundRect">
+            <a:avLst/>
+          </a:prstGeom>
+          <a:solidFill>
             <a:srgbClr val="377EB8"/>
           </a:solidFill>
           <a:ln>
@@ -4626,7 +6318,7 @@
     </p:spTree>
     <p:extLst>
       <p:ext uri="{BB962C8B-B14F-4D97-AF65-F5344CB8AC3E}">
-        <p14:creationId xmlns:p14="http://schemas.microsoft.com/office/powerpoint/2010/main" val="2096939287"/>
+        <p14:creationId xmlns:p14="http://schemas.microsoft.com/office/powerpoint/2010/main" val="272161851"/>
       </p:ext>
     </p:extLst>
   </p:cSld>

</xml_diff>

<commit_message>
Add letters i-vi to the metric boxes on the conceptual model
</commit_message>
<xml_diff>
--- a/figures/main/conceptual_model/conceptual_model.pptx
+++ b/figures/main/conceptual_model/conceptual_model.pptx
@@ -244,7 +244,7 @@
           <a:p>
             <a:fld id="{0C04CBE9-D9B1-4A49-9D6E-53882BEFF763}" type="datetimeFigureOut">
               <a:rPr lang="en-US" smtClean="0"/>
-              <a:t>11/10/2025</a:t>
+              <a:t>2/8/2026</a:t>
             </a:fld>
             <a:endParaRPr lang="en-US"/>
           </a:p>
@@ -414,7 +414,7 @@
           <a:p>
             <a:fld id="{0C04CBE9-D9B1-4A49-9D6E-53882BEFF763}" type="datetimeFigureOut">
               <a:rPr lang="en-US" smtClean="0"/>
-              <a:t>11/10/2025</a:t>
+              <a:t>2/8/2026</a:t>
             </a:fld>
             <a:endParaRPr lang="en-US"/>
           </a:p>
@@ -594,7 +594,7 @@
           <a:p>
             <a:fld id="{0C04CBE9-D9B1-4A49-9D6E-53882BEFF763}" type="datetimeFigureOut">
               <a:rPr lang="en-US" smtClean="0"/>
-              <a:t>11/10/2025</a:t>
+              <a:t>2/8/2026</a:t>
             </a:fld>
             <a:endParaRPr lang="en-US"/>
           </a:p>
@@ -764,7 +764,7 @@
           <a:p>
             <a:fld id="{0C04CBE9-D9B1-4A49-9D6E-53882BEFF763}" type="datetimeFigureOut">
               <a:rPr lang="en-US" smtClean="0"/>
-              <a:t>11/10/2025</a:t>
+              <a:t>2/8/2026</a:t>
             </a:fld>
             <a:endParaRPr lang="en-US"/>
           </a:p>
@@ -1010,7 +1010,7 @@
           <a:p>
             <a:fld id="{0C04CBE9-D9B1-4A49-9D6E-53882BEFF763}" type="datetimeFigureOut">
               <a:rPr lang="en-US" smtClean="0"/>
-              <a:t>11/10/2025</a:t>
+              <a:t>2/8/2026</a:t>
             </a:fld>
             <a:endParaRPr lang="en-US"/>
           </a:p>
@@ -1242,7 +1242,7 @@
           <a:p>
             <a:fld id="{0C04CBE9-D9B1-4A49-9D6E-53882BEFF763}" type="datetimeFigureOut">
               <a:rPr lang="en-US" smtClean="0"/>
-              <a:t>11/10/2025</a:t>
+              <a:t>2/8/2026</a:t>
             </a:fld>
             <a:endParaRPr lang="en-US"/>
           </a:p>
@@ -1609,7 +1609,7 @@
           <a:p>
             <a:fld id="{0C04CBE9-D9B1-4A49-9D6E-53882BEFF763}" type="datetimeFigureOut">
               <a:rPr lang="en-US" smtClean="0"/>
-              <a:t>11/10/2025</a:t>
+              <a:t>2/8/2026</a:t>
             </a:fld>
             <a:endParaRPr lang="en-US"/>
           </a:p>
@@ -1727,7 +1727,7 @@
           <a:p>
             <a:fld id="{0C04CBE9-D9B1-4A49-9D6E-53882BEFF763}" type="datetimeFigureOut">
               <a:rPr lang="en-US" smtClean="0"/>
-              <a:t>11/10/2025</a:t>
+              <a:t>2/8/2026</a:t>
             </a:fld>
             <a:endParaRPr lang="en-US"/>
           </a:p>
@@ -1822,7 +1822,7 @@
           <a:p>
             <a:fld id="{0C04CBE9-D9B1-4A49-9D6E-53882BEFF763}" type="datetimeFigureOut">
               <a:rPr lang="en-US" smtClean="0"/>
-              <a:t>11/10/2025</a:t>
+              <a:t>2/8/2026</a:t>
             </a:fld>
             <a:endParaRPr lang="en-US"/>
           </a:p>
@@ -2099,7 +2099,7 @@
           <a:p>
             <a:fld id="{0C04CBE9-D9B1-4A49-9D6E-53882BEFF763}" type="datetimeFigureOut">
               <a:rPr lang="en-US" smtClean="0"/>
-              <a:t>11/10/2025</a:t>
+              <a:t>2/8/2026</a:t>
             </a:fld>
             <a:endParaRPr lang="en-US"/>
           </a:p>
@@ -2356,7 +2356,7 @@
           <a:p>
             <a:fld id="{0C04CBE9-D9B1-4A49-9D6E-53882BEFF763}" type="datetimeFigureOut">
               <a:rPr lang="en-US" smtClean="0"/>
-              <a:t>11/10/2025</a:t>
+              <a:t>2/8/2026</a:t>
             </a:fld>
             <a:endParaRPr lang="en-US"/>
           </a:p>
@@ -2569,7 +2569,7 @@
           <a:p>
             <a:fld id="{0C04CBE9-D9B1-4A49-9D6E-53882BEFF763}" type="datetimeFigureOut">
               <a:rPr lang="en-US" smtClean="0"/>
-              <a:t>11/10/2025</a:t>
+              <a:t>2/8/2026</a:t>
             </a:fld>
             <a:endParaRPr lang="en-US"/>
           </a:p>
@@ -3026,13 +3026,26 @@
           <a:p>
             <a:pPr algn="ctr"/>
             <a:r>
-              <a:rPr lang="en-US" dirty="0">
+              <a:rPr lang="en-US" dirty="0" err="1" smtClean="0">
                 <a:solidFill>
                   <a:schemeClr val="bg1"/>
                 </a:solidFill>
               </a:rPr>
-              <a:t>Publications</a:t>
-            </a:r>
+              <a:t>i</a:t>
+            </a:r>
+            <a:r>
+              <a:rPr lang="en-US" dirty="0" smtClean="0">
+                <a:solidFill>
+                  <a:schemeClr val="bg1"/>
+                </a:solidFill>
+              </a:rPr>
+              <a:t>) Publications</a:t>
+            </a:r>
+            <a:endParaRPr lang="en-US" dirty="0">
+              <a:solidFill>
+                <a:schemeClr val="bg1"/>
+              </a:solidFill>
+            </a:endParaRPr>
           </a:p>
         </p:txBody>
       </p:sp>
@@ -3088,13 +3101,18 @@
           <a:p>
             <a:pPr algn="ctr"/>
             <a:r>
-              <a:rPr lang="en-US" dirty="0">
+              <a:rPr lang="en-US" sz="2000" dirty="0" smtClean="0">
                 <a:solidFill>
                   <a:schemeClr val="bg1"/>
                 </a:solidFill>
               </a:rPr>
-              <a:t>Legislation</a:t>
-            </a:r>
+              <a:t>iii) Legislation</a:t>
+            </a:r>
+            <a:endParaRPr lang="en-US" sz="2000" dirty="0">
+              <a:solidFill>
+                <a:schemeClr val="bg1"/>
+              </a:solidFill>
+            </a:endParaRPr>
           </a:p>
         </p:txBody>
       </p:sp>
@@ -3150,13 +3168,18 @@
           <a:p>
             <a:pPr algn="ctr"/>
             <a:r>
-              <a:rPr lang="en-US" dirty="0">
+              <a:rPr lang="en-US" dirty="0" smtClean="0">
                 <a:solidFill>
                   <a:schemeClr val="bg1"/>
                 </a:solidFill>
               </a:rPr>
-              <a:t>Interest</a:t>
-            </a:r>
+              <a:t>v) Interest</a:t>
+            </a:r>
+            <a:endParaRPr lang="en-US" dirty="0">
+              <a:solidFill>
+                <a:schemeClr val="bg1"/>
+              </a:solidFill>
+            </a:endParaRPr>
           </a:p>
         </p:txBody>
       </p:sp>
@@ -3212,13 +3235,18 @@
           <a:p>
             <a:pPr algn="ctr"/>
             <a:r>
-              <a:rPr lang="en-US" dirty="0">
+              <a:rPr lang="en-US" dirty="0" smtClean="0">
                 <a:solidFill>
                   <a:schemeClr val="bg1"/>
                 </a:solidFill>
               </a:rPr>
-              <a:t>Support</a:t>
-            </a:r>
+              <a:t>vi) Support</a:t>
+            </a:r>
+            <a:endParaRPr lang="en-US" dirty="0">
+              <a:solidFill>
+                <a:schemeClr val="bg1"/>
+              </a:solidFill>
+            </a:endParaRPr>
           </a:p>
         </p:txBody>
       </p:sp>
@@ -3274,13 +3302,18 @@
           <a:p>
             <a:pPr algn="ctr"/>
             <a:r>
-              <a:rPr lang="en-US" dirty="0">
+              <a:rPr lang="en-US" dirty="0" smtClean="0">
                 <a:solidFill>
                   <a:schemeClr val="bg1"/>
                 </a:solidFill>
               </a:rPr>
-              <a:t>Action</a:t>
-            </a:r>
+              <a:t>iv) Action</a:t>
+            </a:r>
+            <a:endParaRPr lang="en-US" dirty="0">
+              <a:solidFill>
+                <a:schemeClr val="bg1"/>
+              </a:solidFill>
+            </a:endParaRPr>
           </a:p>
         </p:txBody>
       </p:sp>
@@ -4395,13 +4428,18 @@
           <a:p>
             <a:pPr algn="ctr"/>
             <a:r>
-              <a:rPr lang="en-US" dirty="0">
+              <a:rPr lang="en-US" dirty="0" smtClean="0">
                 <a:solidFill>
                   <a:schemeClr val="bg1"/>
                 </a:solidFill>
               </a:rPr>
-              <a:t>Policy</a:t>
-            </a:r>
+              <a:t>ii) Policy</a:t>
+            </a:r>
+            <a:endParaRPr lang="en-US" dirty="0">
+              <a:solidFill>
+                <a:schemeClr val="bg1"/>
+              </a:solidFill>
+            </a:endParaRPr>
           </a:p>
         </p:txBody>
       </p:sp>

</xml_diff>